<commit_message>
Full paper for SC protection is shared.
</commit_message>
<xml_diff>
--- a/Weekly Reports/2019.09.25 - 2019.10.02 Report.pptx
+++ b/Weekly Reports/2019.09.25 - 2019.10.02 Report.pptx
@@ -5,10 +5,12 @@
     <p:sldMasterId id="2147483648" r:id="rId1"/>
   </p:sldMasterIdLst>
   <p:notesMasterIdLst>
-    <p:notesMasterId r:id="rId3"/>
+    <p:notesMasterId r:id="rId5"/>
   </p:notesMasterIdLst>
   <p:sldIdLst>
     <p:sldId id="265" r:id="rId2"/>
+    <p:sldId id="266" r:id="rId3"/>
+    <p:sldId id="267" r:id="rId4"/>
   </p:sldIdLst>
   <p:sldSz cx="12192000" cy="6858000"/>
   <p:notesSz cx="6858000" cy="9144000"/>
@@ -197,7 +199,7 @@
           <a:p>
             <a:fld id="{6967AB47-6931-48C6-B7ED-326D1228AFBA}" type="datetimeFigureOut">
               <a:rPr lang="tr-TR" smtClean="0"/>
-              <a:t>27.09.2019</a:t>
+              <a:t>2.10.2019</a:t>
             </a:fld>
             <a:endParaRPr lang="tr-TR"/>
           </a:p>
@@ -596,7 +598,7 @@
           <a:p>
             <a:fld id="{BD3B3769-65FE-41EA-85B6-D9F2AF76CBA9}" type="datetime1">
               <a:rPr lang="tr-TR" smtClean="0"/>
-              <a:t>27.09.2019</a:t>
+              <a:t>2.10.2019</a:t>
             </a:fld>
             <a:endParaRPr lang="tr-TR"/>
           </a:p>
@@ -766,7 +768,7 @@
           <a:p>
             <a:fld id="{2962A6A9-D976-4BDA-B10C-66B2B9DE9B4C}" type="datetime1">
               <a:rPr lang="tr-TR" smtClean="0"/>
-              <a:t>27.09.2019</a:t>
+              <a:t>2.10.2019</a:t>
             </a:fld>
             <a:endParaRPr lang="tr-TR"/>
           </a:p>
@@ -946,7 +948,7 @@
           <a:p>
             <a:fld id="{5600552A-E4D4-4B40-9929-1D3FB71F71FF}" type="datetime1">
               <a:rPr lang="tr-TR" smtClean="0"/>
-              <a:t>27.09.2019</a:t>
+              <a:t>2.10.2019</a:t>
             </a:fld>
             <a:endParaRPr lang="tr-TR"/>
           </a:p>
@@ -1116,7 +1118,7 @@
           <a:p>
             <a:fld id="{F9A85ECC-3CE4-4AD0-8EC5-3A36763AA76F}" type="datetime1">
               <a:rPr lang="tr-TR" smtClean="0"/>
-              <a:t>27.09.2019</a:t>
+              <a:t>2.10.2019</a:t>
             </a:fld>
             <a:endParaRPr lang="tr-TR"/>
           </a:p>
@@ -1362,7 +1364,7 @@
           <a:p>
             <a:fld id="{39F6AA4B-9646-44CC-B325-B50A183D6636}" type="datetime1">
               <a:rPr lang="tr-TR" smtClean="0"/>
-              <a:t>27.09.2019</a:t>
+              <a:t>2.10.2019</a:t>
             </a:fld>
             <a:endParaRPr lang="tr-TR"/>
           </a:p>
@@ -1594,7 +1596,7 @@
           <a:p>
             <a:fld id="{FD69D89B-A78C-481C-B4BE-82E51E30BA9C}" type="datetime1">
               <a:rPr lang="tr-TR" smtClean="0"/>
-              <a:t>27.09.2019</a:t>
+              <a:t>2.10.2019</a:t>
             </a:fld>
             <a:endParaRPr lang="tr-TR"/>
           </a:p>
@@ -1961,7 +1963,7 @@
           <a:p>
             <a:fld id="{473BE270-57FE-4717-982D-F02DFB5BECD5}" type="datetime1">
               <a:rPr lang="tr-TR" smtClean="0"/>
-              <a:t>27.09.2019</a:t>
+              <a:t>2.10.2019</a:t>
             </a:fld>
             <a:endParaRPr lang="tr-TR"/>
           </a:p>
@@ -2079,7 +2081,7 @@
           <a:p>
             <a:fld id="{BFAEDD45-6991-4862-9E84-DDF92EF341CB}" type="datetime1">
               <a:rPr lang="tr-TR" smtClean="0"/>
-              <a:t>27.09.2019</a:t>
+              <a:t>2.10.2019</a:t>
             </a:fld>
             <a:endParaRPr lang="tr-TR"/>
           </a:p>
@@ -2174,7 +2176,7 @@
           <a:p>
             <a:fld id="{23EE56C6-14E9-4870-96BE-3550760A1300}" type="datetime1">
               <a:rPr lang="tr-TR" smtClean="0"/>
-              <a:t>27.09.2019</a:t>
+              <a:t>2.10.2019</a:t>
             </a:fld>
             <a:endParaRPr lang="tr-TR"/>
           </a:p>
@@ -2451,7 +2453,7 @@
           <a:p>
             <a:fld id="{5EB3015D-7E17-406D-9A1A-3B2ADCD0CF79}" type="datetime1">
               <a:rPr lang="tr-TR" smtClean="0"/>
-              <a:t>27.09.2019</a:t>
+              <a:t>2.10.2019</a:t>
             </a:fld>
             <a:endParaRPr lang="tr-TR"/>
           </a:p>
@@ -2704,7 +2706,7 @@
           <a:p>
             <a:fld id="{8E1B6673-63A0-461F-BFBD-58F4D74CC1A0}" type="datetime1">
               <a:rPr lang="tr-TR" smtClean="0"/>
-              <a:t>27.09.2019</a:t>
+              <a:t>2.10.2019</a:t>
             </a:fld>
             <a:endParaRPr lang="tr-TR"/>
           </a:p>
@@ -2917,7 +2919,7 @@
           <a:p>
             <a:fld id="{9E8EF2ED-7087-4201-9521-97BB02159B09}" type="datetime1">
               <a:rPr lang="tr-TR" smtClean="0"/>
-              <a:t>27.09.2019</a:t>
+              <a:t>2.10.2019</a:t>
             </a:fld>
             <a:endParaRPr lang="tr-TR"/>
           </a:p>
@@ -3563,6 +3565,1007 @@
     <p:extLst>
       <p:ext uri="{BB962C8B-B14F-4D97-AF65-F5344CB8AC3E}">
         <p14:creationId xmlns:p14="http://schemas.microsoft.com/office/powerpoint/2010/main" val="3082183107"/>
+      </p:ext>
+    </p:extLst>
+  </p:cSld>
+  <p:clrMapOvr>
+    <a:masterClrMapping/>
+  </p:clrMapOvr>
+  <p:timing>
+    <p:tnLst>
+      <p:par>
+        <p:cTn id="1" dur="indefinite" restart="never" nodeType="tmRoot"/>
+      </p:par>
+    </p:tnLst>
+  </p:timing>
+</p:sld>
+</file>
+
+<file path=ppt/slides/slide2.xml><?xml version="1.0" encoding="utf-8"?>
+<p:sld xmlns:a="http://schemas.openxmlformats.org/drawingml/2006/main" xmlns:r="http://schemas.openxmlformats.org/officeDocument/2006/relationships" xmlns:p="http://schemas.openxmlformats.org/presentationml/2006/main">
+  <p:cSld>
+    <p:spTree>
+      <p:nvGrpSpPr>
+        <p:cNvPr id="1" name=""/>
+        <p:cNvGrpSpPr/>
+        <p:nvPr/>
+      </p:nvGrpSpPr>
+      <p:grpSpPr>
+        <a:xfrm>
+          <a:off x="0" y="0"/>
+          <a:ext cx="0" cy="0"/>
+          <a:chOff x="0" y="0"/>
+          <a:chExt cx="0" cy="0"/>
+        </a:xfrm>
+      </p:grpSpPr>
+      <p:sp>
+        <p:nvSpPr>
+          <p:cNvPr id="4" name="Slide Number Placeholder 3"/>
+          <p:cNvSpPr>
+            <a:spLocks noGrp="1"/>
+          </p:cNvSpPr>
+          <p:nvPr>
+            <p:ph type="sldNum" sz="quarter" idx="12"/>
+          </p:nvPr>
+        </p:nvSpPr>
+        <p:spPr/>
+        <p:txBody>
+          <a:bodyPr/>
+          <a:lstStyle/>
+          <a:p>
+            <a:fld id="{178508F5-8E49-4F57-B165-331DE2AB85B8}" type="slidenum">
+              <a:rPr lang="tr-TR" sz="1800" smtClean="0"/>
+              <a:t>2</a:t>
+            </a:fld>
+            <a:endParaRPr lang="tr-TR" sz="1800" dirty="0"/>
+          </a:p>
+        </p:txBody>
+      </p:sp>
+      <p:sp>
+        <p:nvSpPr>
+          <p:cNvPr id="5" name="TextBox 4"/>
+          <p:cNvSpPr txBox="1"/>
+          <p:nvPr/>
+        </p:nvSpPr>
+        <p:spPr>
+          <a:xfrm>
+            <a:off x="465992" y="219808"/>
+            <a:ext cx="6268916" cy="523220"/>
+          </a:xfrm>
+          <a:prstGeom prst="rect">
+            <a:avLst/>
+          </a:prstGeom>
+          <a:noFill/>
+        </p:spPr>
+        <p:txBody>
+          <a:bodyPr wrap="square" rtlCol="0">
+            <a:spAutoFit/>
+          </a:bodyPr>
+          <a:lstStyle/>
+          <a:p>
+            <a:r>
+              <a:rPr lang="tr-TR" sz="2800" dirty="0" smtClean="0"/>
+              <a:t>PCB Design – Gate Loop</a:t>
+            </a:r>
+            <a:endParaRPr lang="tr-TR" sz="2800" dirty="0"/>
+          </a:p>
+        </p:txBody>
+      </p:sp>
+      <p:pic>
+        <p:nvPicPr>
+          <p:cNvPr id="3" name="Picture 2"/>
+          <p:cNvPicPr>
+            <a:picLocks noChangeAspect="1"/>
+          </p:cNvPicPr>
+          <p:nvPr/>
+        </p:nvPicPr>
+        <p:blipFill>
+          <a:blip r:embed="rId2"/>
+          <a:stretch>
+            <a:fillRect/>
+          </a:stretch>
+        </p:blipFill>
+        <p:spPr>
+          <a:xfrm>
+            <a:off x="2853836" y="838200"/>
+            <a:ext cx="7258050" cy="5410200"/>
+          </a:xfrm>
+          <a:prstGeom prst="rect">
+            <a:avLst/>
+          </a:prstGeom>
+        </p:spPr>
+      </p:pic>
+      <p:sp>
+        <p:nvSpPr>
+          <p:cNvPr id="8" name="Freeform 7"/>
+          <p:cNvSpPr/>
+          <p:nvPr/>
+        </p:nvSpPr>
+        <p:spPr>
+          <a:xfrm>
+            <a:off x="6053341" y="4187351"/>
+            <a:ext cx="2621746" cy="1223515"/>
+          </a:xfrm>
+          <a:custGeom>
+            <a:avLst/>
+            <a:gdLst>
+              <a:gd name="connsiteX0" fmla="*/ 883790 w 2621746"/>
+              <a:gd name="connsiteY0" fmla="*/ 85711 h 1223515"/>
+              <a:gd name="connsiteX1" fmla="*/ 154028 w 2621746"/>
+              <a:gd name="connsiteY1" fmla="*/ 112087 h 1223515"/>
+              <a:gd name="connsiteX2" fmla="*/ 48521 w 2621746"/>
+              <a:gd name="connsiteY2" fmla="*/ 252764 h 1223515"/>
+              <a:gd name="connsiteX3" fmla="*/ 760697 w 2621746"/>
+              <a:gd name="connsiteY3" fmla="*/ 261557 h 1223515"/>
+              <a:gd name="connsiteX4" fmla="*/ 1516836 w 2621746"/>
+              <a:gd name="connsiteY4" fmla="*/ 287934 h 1223515"/>
+              <a:gd name="connsiteX5" fmla="*/ 1631136 w 2621746"/>
+              <a:gd name="connsiteY5" fmla="*/ 94503 h 1223515"/>
+              <a:gd name="connsiteX6" fmla="*/ 2378482 w 2621746"/>
+              <a:gd name="connsiteY6" fmla="*/ 76918 h 1223515"/>
+              <a:gd name="connsiteX7" fmla="*/ 2545536 w 2621746"/>
+              <a:gd name="connsiteY7" fmla="*/ 1088034 h 1223515"/>
+              <a:gd name="connsiteX8" fmla="*/ 1244274 w 2621746"/>
+              <a:gd name="connsiteY8" fmla="*/ 1114411 h 1223515"/>
+              <a:gd name="connsiteX9" fmla="*/ 1173936 w 2621746"/>
+              <a:gd name="connsiteY9" fmla="*/ 173634 h 1223515"/>
+              <a:gd name="connsiteX10" fmla="*/ 910167 w 2621746"/>
+              <a:gd name="connsiteY10" fmla="*/ 41749 h 1223515"/>
+            </a:gdLst>
+            <a:ahLst/>
+            <a:cxnLst>
+              <a:cxn ang="0">
+                <a:pos x="connsiteX0" y="connsiteY0"/>
+              </a:cxn>
+              <a:cxn ang="0">
+                <a:pos x="connsiteX1" y="connsiteY1"/>
+              </a:cxn>
+              <a:cxn ang="0">
+                <a:pos x="connsiteX2" y="connsiteY2"/>
+              </a:cxn>
+              <a:cxn ang="0">
+                <a:pos x="connsiteX3" y="connsiteY3"/>
+              </a:cxn>
+              <a:cxn ang="0">
+                <a:pos x="connsiteX4" y="connsiteY4"/>
+              </a:cxn>
+              <a:cxn ang="0">
+                <a:pos x="connsiteX5" y="connsiteY5"/>
+              </a:cxn>
+              <a:cxn ang="0">
+                <a:pos x="connsiteX6" y="connsiteY6"/>
+              </a:cxn>
+              <a:cxn ang="0">
+                <a:pos x="connsiteX7" y="connsiteY7"/>
+              </a:cxn>
+              <a:cxn ang="0">
+                <a:pos x="connsiteX8" y="connsiteY8"/>
+              </a:cxn>
+              <a:cxn ang="0">
+                <a:pos x="connsiteX9" y="connsiteY9"/>
+              </a:cxn>
+              <a:cxn ang="0">
+                <a:pos x="connsiteX10" y="connsiteY10"/>
+              </a:cxn>
+            </a:cxnLst>
+            <a:rect l="l" t="t" r="r" b="b"/>
+            <a:pathLst>
+              <a:path w="2621746" h="1223515">
+                <a:moveTo>
+                  <a:pt x="883790" y="85711"/>
+                </a:moveTo>
+                <a:cubicBezTo>
+                  <a:pt x="588514" y="84978"/>
+                  <a:pt x="293239" y="84245"/>
+                  <a:pt x="154028" y="112087"/>
+                </a:cubicBezTo>
+                <a:cubicBezTo>
+                  <a:pt x="14817" y="139929"/>
+                  <a:pt x="-52590" y="227852"/>
+                  <a:pt x="48521" y="252764"/>
+                </a:cubicBezTo>
+                <a:cubicBezTo>
+                  <a:pt x="149632" y="277676"/>
+                  <a:pt x="515978" y="255695"/>
+                  <a:pt x="760697" y="261557"/>
+                </a:cubicBezTo>
+                <a:cubicBezTo>
+                  <a:pt x="1005416" y="267419"/>
+                  <a:pt x="1371763" y="315776"/>
+                  <a:pt x="1516836" y="287934"/>
+                </a:cubicBezTo>
+                <a:cubicBezTo>
+                  <a:pt x="1661909" y="260092"/>
+                  <a:pt x="1487529" y="129672"/>
+                  <a:pt x="1631136" y="94503"/>
+                </a:cubicBezTo>
+                <a:cubicBezTo>
+                  <a:pt x="1774743" y="59334"/>
+                  <a:pt x="2226082" y="-88670"/>
+                  <a:pt x="2378482" y="76918"/>
+                </a:cubicBezTo>
+                <a:cubicBezTo>
+                  <a:pt x="2530882" y="242506"/>
+                  <a:pt x="2734571" y="915119"/>
+                  <a:pt x="2545536" y="1088034"/>
+                </a:cubicBezTo>
+                <a:cubicBezTo>
+                  <a:pt x="2356501" y="1260949"/>
+                  <a:pt x="1472874" y="1266811"/>
+                  <a:pt x="1244274" y="1114411"/>
+                </a:cubicBezTo>
+                <a:cubicBezTo>
+                  <a:pt x="1015674" y="962011"/>
+                  <a:pt x="1229620" y="352411"/>
+                  <a:pt x="1173936" y="173634"/>
+                </a:cubicBezTo>
+                <a:cubicBezTo>
+                  <a:pt x="1118252" y="-5143"/>
+                  <a:pt x="1014209" y="18303"/>
+                  <a:pt x="910167" y="41749"/>
+                </a:cubicBezTo>
+              </a:path>
+            </a:pathLst>
+          </a:custGeom>
+          <a:noFill/>
+          <a:ln w="38100">
+            <a:solidFill>
+              <a:srgbClr val="FF0000"/>
+            </a:solidFill>
+            <a:headEnd type="none" w="med" len="med"/>
+            <a:tailEnd type="triangle" w="med" len="med"/>
+          </a:ln>
+        </p:spPr>
+        <p:style>
+          <a:lnRef idx="2">
+            <a:schemeClr val="accent1">
+              <a:shade val="50000"/>
+            </a:schemeClr>
+          </a:lnRef>
+          <a:fillRef idx="1">
+            <a:schemeClr val="accent1"/>
+          </a:fillRef>
+          <a:effectRef idx="0">
+            <a:schemeClr val="accent1"/>
+          </a:effectRef>
+          <a:fontRef idx="minor">
+            <a:schemeClr val="lt1"/>
+          </a:fontRef>
+        </p:style>
+        <p:txBody>
+          <a:bodyPr rtlCol="0" anchor="ctr"/>
+          <a:lstStyle/>
+          <a:p>
+            <a:pPr algn="ctr"/>
+            <a:endParaRPr lang="tr-TR"/>
+          </a:p>
+        </p:txBody>
+      </p:sp>
+      <p:sp>
+        <p:nvSpPr>
+          <p:cNvPr id="10" name="Freeform 9"/>
+          <p:cNvSpPr/>
+          <p:nvPr/>
+        </p:nvSpPr>
+        <p:spPr>
+          <a:xfrm>
+            <a:off x="6242018" y="4598377"/>
+            <a:ext cx="2460292" cy="759107"/>
+          </a:xfrm>
+          <a:custGeom>
+            <a:avLst/>
+            <a:gdLst>
+              <a:gd name="connsiteX0" fmla="*/ 932505 w 2460292"/>
+              <a:gd name="connsiteY0" fmla="*/ 0 h 759107"/>
+              <a:gd name="connsiteX1" fmla="*/ 677528 w 2460292"/>
+              <a:gd name="connsiteY1" fmla="*/ 386861 h 759107"/>
+              <a:gd name="connsiteX2" fmla="*/ 114820 w 2460292"/>
+              <a:gd name="connsiteY2" fmla="*/ 422031 h 759107"/>
+              <a:gd name="connsiteX3" fmla="*/ 123613 w 2460292"/>
+              <a:gd name="connsiteY3" fmla="*/ 553915 h 759107"/>
+              <a:gd name="connsiteX4" fmla="*/ 1416082 w 2460292"/>
+              <a:gd name="connsiteY4" fmla="*/ 571500 h 759107"/>
+              <a:gd name="connsiteX5" fmla="*/ 1565551 w 2460292"/>
+              <a:gd name="connsiteY5" fmla="*/ 378069 h 759107"/>
+              <a:gd name="connsiteX6" fmla="*/ 2172220 w 2460292"/>
+              <a:gd name="connsiteY6" fmla="*/ 360485 h 759107"/>
+              <a:gd name="connsiteX7" fmla="*/ 2383236 w 2460292"/>
+              <a:gd name="connsiteY7" fmla="*/ 184638 h 759107"/>
+              <a:gd name="connsiteX8" fmla="*/ 2339274 w 2460292"/>
+              <a:gd name="connsiteY8" fmla="*/ 694592 h 759107"/>
+              <a:gd name="connsiteX9" fmla="*/ 1029220 w 2460292"/>
+              <a:gd name="connsiteY9" fmla="*/ 738554 h 759107"/>
+              <a:gd name="connsiteX10" fmla="*/ 914920 w 2460292"/>
+              <a:gd name="connsiteY10" fmla="*/ 571500 h 759107"/>
+              <a:gd name="connsiteX11" fmla="*/ 967674 w 2460292"/>
+              <a:gd name="connsiteY11" fmla="*/ 70338 h 759107"/>
+            </a:gdLst>
+            <a:ahLst/>
+            <a:cxnLst>
+              <a:cxn ang="0">
+                <a:pos x="connsiteX0" y="connsiteY0"/>
+              </a:cxn>
+              <a:cxn ang="0">
+                <a:pos x="connsiteX1" y="connsiteY1"/>
+              </a:cxn>
+              <a:cxn ang="0">
+                <a:pos x="connsiteX2" y="connsiteY2"/>
+              </a:cxn>
+              <a:cxn ang="0">
+                <a:pos x="connsiteX3" y="connsiteY3"/>
+              </a:cxn>
+              <a:cxn ang="0">
+                <a:pos x="connsiteX4" y="connsiteY4"/>
+              </a:cxn>
+              <a:cxn ang="0">
+                <a:pos x="connsiteX5" y="connsiteY5"/>
+              </a:cxn>
+              <a:cxn ang="0">
+                <a:pos x="connsiteX6" y="connsiteY6"/>
+              </a:cxn>
+              <a:cxn ang="0">
+                <a:pos x="connsiteX7" y="connsiteY7"/>
+              </a:cxn>
+              <a:cxn ang="0">
+                <a:pos x="connsiteX8" y="connsiteY8"/>
+              </a:cxn>
+              <a:cxn ang="0">
+                <a:pos x="connsiteX9" y="connsiteY9"/>
+              </a:cxn>
+              <a:cxn ang="0">
+                <a:pos x="connsiteX10" y="connsiteY10"/>
+              </a:cxn>
+              <a:cxn ang="0">
+                <a:pos x="connsiteX11" y="connsiteY11"/>
+              </a:cxn>
+            </a:cxnLst>
+            <a:rect l="l" t="t" r="r" b="b"/>
+            <a:pathLst>
+              <a:path w="2460292" h="759107">
+                <a:moveTo>
+                  <a:pt x="932505" y="0"/>
+                </a:moveTo>
+                <a:cubicBezTo>
+                  <a:pt x="873157" y="158261"/>
+                  <a:pt x="813809" y="316523"/>
+                  <a:pt x="677528" y="386861"/>
+                </a:cubicBezTo>
+                <a:cubicBezTo>
+                  <a:pt x="541247" y="457199"/>
+                  <a:pt x="207139" y="394189"/>
+                  <a:pt x="114820" y="422031"/>
+                </a:cubicBezTo>
+                <a:cubicBezTo>
+                  <a:pt x="22501" y="449873"/>
+                  <a:pt x="-93264" y="529004"/>
+                  <a:pt x="123613" y="553915"/>
+                </a:cubicBezTo>
+                <a:cubicBezTo>
+                  <a:pt x="340490" y="578827"/>
+                  <a:pt x="1175759" y="600808"/>
+                  <a:pt x="1416082" y="571500"/>
+                </a:cubicBezTo>
+                <a:cubicBezTo>
+                  <a:pt x="1656405" y="542192"/>
+                  <a:pt x="1439528" y="413238"/>
+                  <a:pt x="1565551" y="378069"/>
+                </a:cubicBezTo>
+                <a:cubicBezTo>
+                  <a:pt x="1691574" y="342900"/>
+                  <a:pt x="2035939" y="392724"/>
+                  <a:pt x="2172220" y="360485"/>
+                </a:cubicBezTo>
+                <a:cubicBezTo>
+                  <a:pt x="2308501" y="328247"/>
+                  <a:pt x="2355394" y="128954"/>
+                  <a:pt x="2383236" y="184638"/>
+                </a:cubicBezTo>
+                <a:cubicBezTo>
+                  <a:pt x="2411078" y="240322"/>
+                  <a:pt x="2564943" y="602273"/>
+                  <a:pt x="2339274" y="694592"/>
+                </a:cubicBezTo>
+                <a:cubicBezTo>
+                  <a:pt x="2113605" y="786911"/>
+                  <a:pt x="1266612" y="759069"/>
+                  <a:pt x="1029220" y="738554"/>
+                </a:cubicBezTo>
+                <a:cubicBezTo>
+                  <a:pt x="791828" y="718039"/>
+                  <a:pt x="925178" y="682869"/>
+                  <a:pt x="914920" y="571500"/>
+                </a:cubicBezTo>
+                <a:cubicBezTo>
+                  <a:pt x="904662" y="460131"/>
+                  <a:pt x="967674" y="70338"/>
+                  <a:pt x="967674" y="70338"/>
+                </a:cubicBezTo>
+              </a:path>
+            </a:pathLst>
+          </a:custGeom>
+          <a:ln w="38100">
+            <a:headEnd type="none" w="med" len="med"/>
+            <a:tailEnd type="triangle" w="med" len="med"/>
+          </a:ln>
+        </p:spPr>
+        <p:style>
+          <a:lnRef idx="3">
+            <a:schemeClr val="accent5"/>
+          </a:lnRef>
+          <a:fillRef idx="0">
+            <a:schemeClr val="accent5"/>
+          </a:fillRef>
+          <a:effectRef idx="2">
+            <a:schemeClr val="accent5"/>
+          </a:effectRef>
+          <a:fontRef idx="minor">
+            <a:schemeClr val="tx1"/>
+          </a:fontRef>
+        </p:style>
+        <p:txBody>
+          <a:bodyPr rtlCol="0" anchor="ctr"/>
+          <a:lstStyle/>
+          <a:p>
+            <a:pPr algn="ctr"/>
+            <a:endParaRPr lang="tr-TR"/>
+          </a:p>
+        </p:txBody>
+      </p:sp>
+      <p:sp>
+        <p:nvSpPr>
+          <p:cNvPr id="14" name="Oval 13"/>
+          <p:cNvSpPr/>
+          <p:nvPr/>
+        </p:nvSpPr>
+        <p:spPr>
+          <a:xfrm>
+            <a:off x="7886180" y="4575489"/>
+            <a:ext cx="492890" cy="571500"/>
+          </a:xfrm>
+          <a:prstGeom prst="ellipse">
+            <a:avLst/>
+          </a:prstGeom>
+          <a:noFill/>
+          <a:ln w="38100" cap="flat" cmpd="sng" algn="ctr">
+            <a:solidFill>
+              <a:schemeClr val="accent6"/>
+            </a:solidFill>
+            <a:prstDash val="solid"/>
+            <a:round/>
+            <a:headEnd type="none" w="med" len="med"/>
+            <a:tailEnd type="none" w="med" len="med"/>
+          </a:ln>
+        </p:spPr>
+        <p:style>
+          <a:lnRef idx="0">
+            <a:scrgbClr r="0" g="0" b="0"/>
+          </a:lnRef>
+          <a:fillRef idx="0">
+            <a:scrgbClr r="0" g="0" b="0"/>
+          </a:fillRef>
+          <a:effectRef idx="0">
+            <a:scrgbClr r="0" g="0" b="0"/>
+          </a:effectRef>
+          <a:fontRef idx="minor">
+            <a:schemeClr val="accent6"/>
+          </a:fontRef>
+        </p:style>
+        <p:txBody>
+          <a:bodyPr rtlCol="0" anchor="ctr"/>
+          <a:lstStyle/>
+          <a:p>
+            <a:pPr algn="ctr"/>
+            <a:endParaRPr lang="tr-TR"/>
+          </a:p>
+        </p:txBody>
+      </p:sp>
+      <p:sp>
+        <p:nvSpPr>
+          <p:cNvPr id="16" name="Oval 15"/>
+          <p:cNvSpPr/>
+          <p:nvPr/>
+        </p:nvSpPr>
+        <p:spPr>
+          <a:xfrm>
+            <a:off x="7757226" y="3870972"/>
+            <a:ext cx="492890" cy="571500"/>
+          </a:xfrm>
+          <a:prstGeom prst="ellipse">
+            <a:avLst/>
+          </a:prstGeom>
+          <a:noFill/>
+          <a:ln w="38100" cap="flat" cmpd="sng" algn="ctr">
+            <a:solidFill>
+              <a:schemeClr val="accent6"/>
+            </a:solidFill>
+            <a:prstDash val="solid"/>
+            <a:round/>
+            <a:headEnd type="none" w="med" len="med"/>
+            <a:tailEnd type="none" w="med" len="med"/>
+          </a:ln>
+        </p:spPr>
+        <p:style>
+          <a:lnRef idx="0">
+            <a:scrgbClr r="0" g="0" b="0"/>
+          </a:lnRef>
+          <a:fillRef idx="0">
+            <a:scrgbClr r="0" g="0" b="0"/>
+          </a:fillRef>
+          <a:effectRef idx="0">
+            <a:scrgbClr r="0" g="0" b="0"/>
+          </a:effectRef>
+          <a:fontRef idx="minor">
+            <a:schemeClr val="accent6"/>
+          </a:fontRef>
+        </p:style>
+        <p:txBody>
+          <a:bodyPr rtlCol="0" anchor="ctr"/>
+          <a:lstStyle/>
+          <a:p>
+            <a:pPr algn="ctr"/>
+            <a:endParaRPr lang="tr-TR"/>
+          </a:p>
+        </p:txBody>
+      </p:sp>
+      <p:sp>
+        <p:nvSpPr>
+          <p:cNvPr id="17" name="Oval 16"/>
+          <p:cNvSpPr/>
+          <p:nvPr/>
+        </p:nvSpPr>
+        <p:spPr>
+          <a:xfrm>
+            <a:off x="6324080" y="4615755"/>
+            <a:ext cx="492890" cy="571500"/>
+          </a:xfrm>
+          <a:prstGeom prst="ellipse">
+            <a:avLst/>
+          </a:prstGeom>
+          <a:noFill/>
+          <a:ln w="38100" cap="flat" cmpd="sng" algn="ctr">
+            <a:solidFill>
+              <a:schemeClr val="accent6"/>
+            </a:solidFill>
+            <a:prstDash val="solid"/>
+            <a:round/>
+            <a:headEnd type="none" w="med" len="med"/>
+            <a:tailEnd type="none" w="med" len="med"/>
+          </a:ln>
+        </p:spPr>
+        <p:style>
+          <a:lnRef idx="0">
+            <a:scrgbClr r="0" g="0" b="0"/>
+          </a:lnRef>
+          <a:fillRef idx="0">
+            <a:scrgbClr r="0" g="0" b="0"/>
+          </a:fillRef>
+          <a:effectRef idx="0">
+            <a:scrgbClr r="0" g="0" b="0"/>
+          </a:effectRef>
+          <a:fontRef idx="minor">
+            <a:schemeClr val="accent6"/>
+          </a:fontRef>
+        </p:style>
+        <p:txBody>
+          <a:bodyPr rtlCol="0" anchor="ctr"/>
+          <a:lstStyle/>
+          <a:p>
+            <a:pPr algn="ctr"/>
+            <a:endParaRPr lang="tr-TR"/>
+          </a:p>
+        </p:txBody>
+      </p:sp>
+      <p:sp>
+        <p:nvSpPr>
+          <p:cNvPr id="18" name="Oval 17"/>
+          <p:cNvSpPr/>
+          <p:nvPr/>
+        </p:nvSpPr>
+        <p:spPr>
+          <a:xfrm>
+            <a:off x="6297703" y="3870972"/>
+            <a:ext cx="492890" cy="571500"/>
+          </a:xfrm>
+          <a:prstGeom prst="ellipse">
+            <a:avLst/>
+          </a:prstGeom>
+          <a:noFill/>
+          <a:ln w="38100" cap="flat" cmpd="sng" algn="ctr">
+            <a:solidFill>
+              <a:schemeClr val="accent6"/>
+            </a:solidFill>
+            <a:prstDash val="solid"/>
+            <a:round/>
+            <a:headEnd type="none" w="med" len="med"/>
+            <a:tailEnd type="none" w="med" len="med"/>
+          </a:ln>
+        </p:spPr>
+        <p:style>
+          <a:lnRef idx="0">
+            <a:scrgbClr r="0" g="0" b="0"/>
+          </a:lnRef>
+          <a:fillRef idx="0">
+            <a:scrgbClr r="0" g="0" b="0"/>
+          </a:fillRef>
+          <a:effectRef idx="0">
+            <a:scrgbClr r="0" g="0" b="0"/>
+          </a:effectRef>
+          <a:fontRef idx="minor">
+            <a:schemeClr val="accent6"/>
+          </a:fontRef>
+        </p:style>
+        <p:txBody>
+          <a:bodyPr rtlCol="0" anchor="ctr"/>
+          <a:lstStyle/>
+          <a:p>
+            <a:pPr algn="ctr"/>
+            <a:endParaRPr lang="tr-TR"/>
+          </a:p>
+        </p:txBody>
+      </p:sp>
+      <p:sp>
+        <p:nvSpPr>
+          <p:cNvPr id="15" name="TextBox 14"/>
+          <p:cNvSpPr txBox="1"/>
+          <p:nvPr/>
+        </p:nvSpPr>
+        <p:spPr>
+          <a:xfrm>
+            <a:off x="6945190" y="5615582"/>
+            <a:ext cx="3037010" cy="923330"/>
+          </a:xfrm>
+          <a:prstGeom prst="rect">
+            <a:avLst/>
+          </a:prstGeom>
+          <a:noFill/>
+        </p:spPr>
+        <p:txBody>
+          <a:bodyPr wrap="square" rtlCol="0">
+            <a:spAutoFit/>
+          </a:bodyPr>
+          <a:lstStyle/>
+          <a:p>
+            <a:r>
+              <a:rPr lang="tr-TR" dirty="0" smtClean="0">
+                <a:solidFill>
+                  <a:srgbClr val="92D050"/>
+                </a:solidFill>
+              </a:rPr>
+              <a:t>Resistances to be placed on CSI loops to eliminate unbalance and oscillations</a:t>
+            </a:r>
+            <a:endParaRPr lang="tr-TR" dirty="0">
+              <a:solidFill>
+                <a:srgbClr val="92D050"/>
+              </a:solidFill>
+            </a:endParaRPr>
+          </a:p>
+        </p:txBody>
+      </p:sp>
+    </p:spTree>
+    <p:extLst>
+      <p:ext uri="{BB962C8B-B14F-4D97-AF65-F5344CB8AC3E}">
+        <p14:creationId xmlns:p14="http://schemas.microsoft.com/office/powerpoint/2010/main" val="399332084"/>
+      </p:ext>
+    </p:extLst>
+  </p:cSld>
+  <p:clrMapOvr>
+    <a:masterClrMapping/>
+  </p:clrMapOvr>
+  <p:timing>
+    <p:tnLst>
+      <p:par>
+        <p:cTn id="1" dur="indefinite" restart="never" nodeType="tmRoot"/>
+      </p:par>
+    </p:tnLst>
+  </p:timing>
+</p:sld>
+</file>
+
+<file path=ppt/slides/slide3.xml><?xml version="1.0" encoding="utf-8"?>
+<p:sld xmlns:a="http://schemas.openxmlformats.org/drawingml/2006/main" xmlns:r="http://schemas.openxmlformats.org/officeDocument/2006/relationships" xmlns:p="http://schemas.openxmlformats.org/presentationml/2006/main">
+  <p:cSld>
+    <p:spTree>
+      <p:nvGrpSpPr>
+        <p:cNvPr id="1" name=""/>
+        <p:cNvGrpSpPr/>
+        <p:nvPr/>
+      </p:nvGrpSpPr>
+      <p:grpSpPr>
+        <a:xfrm>
+          <a:off x="0" y="0"/>
+          <a:ext cx="0" cy="0"/>
+          <a:chOff x="0" y="0"/>
+          <a:chExt cx="0" cy="0"/>
+        </a:xfrm>
+      </p:grpSpPr>
+      <p:sp>
+        <p:nvSpPr>
+          <p:cNvPr id="4" name="Slide Number Placeholder 3"/>
+          <p:cNvSpPr>
+            <a:spLocks noGrp="1"/>
+          </p:cNvSpPr>
+          <p:nvPr>
+            <p:ph type="sldNum" sz="quarter" idx="12"/>
+          </p:nvPr>
+        </p:nvSpPr>
+        <p:spPr/>
+        <p:txBody>
+          <a:bodyPr/>
+          <a:lstStyle/>
+          <a:p>
+            <a:fld id="{178508F5-8E49-4F57-B165-331DE2AB85B8}" type="slidenum">
+              <a:rPr lang="tr-TR" sz="1800" smtClean="0"/>
+              <a:t>3</a:t>
+            </a:fld>
+            <a:endParaRPr lang="tr-TR" sz="1800" dirty="0"/>
+          </a:p>
+        </p:txBody>
+      </p:sp>
+      <p:sp>
+        <p:nvSpPr>
+          <p:cNvPr id="5" name="TextBox 4"/>
+          <p:cNvSpPr txBox="1"/>
+          <p:nvPr/>
+        </p:nvSpPr>
+        <p:spPr>
+          <a:xfrm>
+            <a:off x="465992" y="219808"/>
+            <a:ext cx="6268916" cy="523220"/>
+          </a:xfrm>
+          <a:prstGeom prst="rect">
+            <a:avLst/>
+          </a:prstGeom>
+          <a:noFill/>
+        </p:spPr>
+        <p:txBody>
+          <a:bodyPr wrap="square" rtlCol="0">
+            <a:spAutoFit/>
+          </a:bodyPr>
+          <a:lstStyle/>
+          <a:p>
+            <a:r>
+              <a:rPr lang="tr-TR" sz="2800" dirty="0" smtClean="0"/>
+              <a:t>PCB Design – Power Loop</a:t>
+            </a:r>
+            <a:endParaRPr lang="tr-TR" sz="2800" dirty="0"/>
+          </a:p>
+        </p:txBody>
+      </p:sp>
+      <p:pic>
+        <p:nvPicPr>
+          <p:cNvPr id="2" name="Picture 1"/>
+          <p:cNvPicPr>
+            <a:picLocks noChangeAspect="1"/>
+          </p:cNvPicPr>
+          <p:nvPr/>
+        </p:nvPicPr>
+        <p:blipFill>
+          <a:blip r:embed="rId2"/>
+          <a:stretch>
+            <a:fillRect/>
+          </a:stretch>
+        </p:blipFill>
+        <p:spPr>
+          <a:xfrm>
+            <a:off x="4433228" y="743028"/>
+            <a:ext cx="5137566" cy="5968512"/>
+          </a:xfrm>
+          <a:prstGeom prst="rect">
+            <a:avLst/>
+          </a:prstGeom>
+        </p:spPr>
+      </p:pic>
+      <p:sp>
+        <p:nvSpPr>
+          <p:cNvPr id="6" name="Oval 5"/>
+          <p:cNvSpPr/>
+          <p:nvPr/>
+        </p:nvSpPr>
+        <p:spPr>
+          <a:xfrm>
+            <a:off x="7221488" y="4997040"/>
+            <a:ext cx="637442" cy="597877"/>
+          </a:xfrm>
+          <a:prstGeom prst="ellipse">
+            <a:avLst/>
+          </a:prstGeom>
+          <a:noFill/>
+          <a:ln w="38100" cap="flat" cmpd="sng" algn="ctr">
+            <a:solidFill>
+              <a:schemeClr val="dk1"/>
+            </a:solidFill>
+            <a:prstDash val="solid"/>
+            <a:round/>
+            <a:headEnd type="none" w="med" len="med"/>
+            <a:tailEnd type="none" w="med" len="med"/>
+          </a:ln>
+        </p:spPr>
+        <p:style>
+          <a:lnRef idx="0">
+            <a:scrgbClr r="0" g="0" b="0"/>
+          </a:lnRef>
+          <a:fillRef idx="0">
+            <a:scrgbClr r="0" g="0" b="0"/>
+          </a:fillRef>
+          <a:effectRef idx="0">
+            <a:scrgbClr r="0" g="0" b="0"/>
+          </a:effectRef>
+          <a:fontRef idx="minor">
+            <a:schemeClr val="dk1"/>
+          </a:fontRef>
+        </p:style>
+        <p:txBody>
+          <a:bodyPr rtlCol="0" anchor="ctr"/>
+          <a:lstStyle/>
+          <a:p>
+            <a:pPr algn="ctr"/>
+            <a:endParaRPr lang="tr-TR">
+              <a:solidFill>
+                <a:srgbClr val="FFFF00"/>
+              </a:solidFill>
+            </a:endParaRPr>
+          </a:p>
+        </p:txBody>
+      </p:sp>
+      <p:cxnSp>
+        <p:nvCxnSpPr>
+          <p:cNvPr id="9" name="Straight Arrow Connector 8"/>
+          <p:cNvCxnSpPr/>
+          <p:nvPr/>
+        </p:nvCxnSpPr>
+        <p:spPr>
+          <a:xfrm flipV="1">
+            <a:off x="7858930" y="4873948"/>
+            <a:ext cx="1375996" cy="272561"/>
+          </a:xfrm>
+          <a:prstGeom prst="straightConnector1">
+            <a:avLst/>
+          </a:prstGeom>
+          <a:ln w="38100">
+            <a:tailEnd type="triangle"/>
+          </a:ln>
+        </p:spPr>
+        <p:style>
+          <a:lnRef idx="1">
+            <a:schemeClr val="dk1"/>
+          </a:lnRef>
+          <a:fillRef idx="0">
+            <a:schemeClr val="dk1"/>
+          </a:fillRef>
+          <a:effectRef idx="0">
+            <a:schemeClr val="dk1"/>
+          </a:effectRef>
+          <a:fontRef idx="minor">
+            <a:schemeClr val="tx1"/>
+          </a:fontRef>
+        </p:style>
+      </p:cxnSp>
+      <p:sp>
+        <p:nvSpPr>
+          <p:cNvPr id="11" name="TextBox 10"/>
+          <p:cNvSpPr txBox="1"/>
+          <p:nvPr/>
+        </p:nvSpPr>
+        <p:spPr>
+          <a:xfrm>
+            <a:off x="9234926" y="4273783"/>
+            <a:ext cx="2957074" cy="1200329"/>
+          </a:xfrm>
+          <a:prstGeom prst="rect">
+            <a:avLst/>
+          </a:prstGeom>
+          <a:noFill/>
+        </p:spPr>
+        <p:txBody>
+          <a:bodyPr wrap="square" rtlCol="0">
+            <a:spAutoFit/>
+          </a:bodyPr>
+          <a:lstStyle/>
+          <a:p>
+            <a:r>
+              <a:rPr lang="tr-TR" dirty="0" smtClean="0"/>
+              <a:t>Positive and negative nets of DC Bus coincide here. Clearence and route width are the concerns</a:t>
+            </a:r>
+            <a:endParaRPr lang="tr-TR" dirty="0"/>
+          </a:p>
+        </p:txBody>
+      </p:sp>
+      <p:sp>
+        <p:nvSpPr>
+          <p:cNvPr id="21" name="TextBox 20"/>
+          <p:cNvSpPr txBox="1"/>
+          <p:nvPr/>
+        </p:nvSpPr>
+        <p:spPr>
+          <a:xfrm>
+            <a:off x="132572" y="1572831"/>
+            <a:ext cx="2957074" cy="1200329"/>
+          </a:xfrm>
+          <a:prstGeom prst="rect">
+            <a:avLst/>
+          </a:prstGeom>
+          <a:noFill/>
+        </p:spPr>
+        <p:txBody>
+          <a:bodyPr wrap="square" rtlCol="0">
+            <a:spAutoFit/>
+          </a:bodyPr>
+          <a:lstStyle/>
+          <a:p>
+            <a:r>
+              <a:rPr lang="tr-TR" dirty="0" smtClean="0"/>
+              <a:t>The main concern for top cooled transistors is having bypass capacitors on the top layer because of the heatsink</a:t>
+            </a:r>
+            <a:endParaRPr lang="tr-TR" dirty="0"/>
+          </a:p>
+        </p:txBody>
+      </p:sp>
+      <p:pic>
+        <p:nvPicPr>
+          <p:cNvPr id="22" name="Picture 21"/>
+          <p:cNvPicPr>
+            <a:picLocks noChangeAspect="1"/>
+          </p:cNvPicPr>
+          <p:nvPr/>
+        </p:nvPicPr>
+        <p:blipFill>
+          <a:blip r:embed="rId3"/>
+          <a:stretch>
+            <a:fillRect/>
+          </a:stretch>
+        </p:blipFill>
+        <p:spPr>
+          <a:xfrm>
+            <a:off x="132572" y="2773160"/>
+            <a:ext cx="4634077" cy="1728422"/>
+          </a:xfrm>
+          <a:prstGeom prst="rect">
+            <a:avLst/>
+          </a:prstGeom>
+        </p:spPr>
+      </p:pic>
+      <p:sp>
+        <p:nvSpPr>
+          <p:cNvPr id="23" name="TextBox 22"/>
+          <p:cNvSpPr txBox="1"/>
+          <p:nvPr/>
+        </p:nvSpPr>
+        <p:spPr>
+          <a:xfrm>
+            <a:off x="1812022" y="4504615"/>
+            <a:ext cx="1447872" cy="369332"/>
+          </a:xfrm>
+          <a:prstGeom prst="rect">
+            <a:avLst/>
+          </a:prstGeom>
+          <a:noFill/>
+        </p:spPr>
+        <p:txBody>
+          <a:bodyPr wrap="square" rtlCol="0">
+            <a:spAutoFit/>
+          </a:bodyPr>
+          <a:lstStyle/>
+          <a:p>
+            <a:r>
+              <a:rPr lang="tr-TR" b="1" dirty="0" smtClean="0">
+                <a:solidFill>
+                  <a:srgbClr val="FF0000"/>
+                </a:solidFill>
+              </a:rPr>
+              <a:t>Not possible</a:t>
+            </a:r>
+            <a:endParaRPr lang="tr-TR" b="1" dirty="0">
+              <a:solidFill>
+                <a:srgbClr val="FF0000"/>
+              </a:solidFill>
+            </a:endParaRPr>
+          </a:p>
+        </p:txBody>
+      </p:sp>
+    </p:spTree>
+    <p:extLst>
+      <p:ext uri="{BB962C8B-B14F-4D97-AF65-F5344CB8AC3E}">
+        <p14:creationId xmlns:p14="http://schemas.microsoft.com/office/powerpoint/2010/main" val="2111610414"/>
       </p:ext>
     </p:extLst>
   </p:cSld>

</xml_diff>